<commit_message>
adding that SphinxES is a header format rather than a protocol in Figure 1, as suggested by Sonja
</commit_message>
<xml_diff>
--- a/paper/figures/OverviewSPORES.pptx
+++ b/paper/figures/OverviewSPORES.pptx
@@ -302,7 +302,7 @@
           <a:p>
             <a:fld id="{756D4E82-7815-AC48-AE87-A78DE185AB60}" type="datetimeFigureOut">
               <a:rPr lang="fr-FR" smtClean="0"/>
-              <a:t>07/08/2018</a:t>
+              <a:t>08/08/2018</a:t>
             </a:fld>
             <a:endParaRPr lang="en-US"/>
           </a:p>
@@ -470,7 +470,7 @@
           <a:p>
             <a:fld id="{756D4E82-7815-AC48-AE87-A78DE185AB60}" type="datetimeFigureOut">
               <a:rPr lang="fr-FR" smtClean="0"/>
-              <a:t>07/08/2018</a:t>
+              <a:t>08/08/2018</a:t>
             </a:fld>
             <a:endParaRPr lang="en-US"/>
           </a:p>
@@ -648,7 +648,7 @@
           <a:p>
             <a:fld id="{756D4E82-7815-AC48-AE87-A78DE185AB60}" type="datetimeFigureOut">
               <a:rPr lang="fr-FR" smtClean="0"/>
-              <a:t>07/08/2018</a:t>
+              <a:t>08/08/2018</a:t>
             </a:fld>
             <a:endParaRPr lang="en-US"/>
           </a:p>
@@ -816,7 +816,7 @@
           <a:p>
             <a:fld id="{756D4E82-7815-AC48-AE87-A78DE185AB60}" type="datetimeFigureOut">
               <a:rPr lang="fr-FR" smtClean="0"/>
-              <a:t>07/08/2018</a:t>
+              <a:t>08/08/2018</a:t>
             </a:fld>
             <a:endParaRPr lang="en-US"/>
           </a:p>
@@ -1061,7 +1061,7 @@
           <a:p>
             <a:fld id="{756D4E82-7815-AC48-AE87-A78DE185AB60}" type="datetimeFigureOut">
               <a:rPr lang="fr-FR" smtClean="0"/>
-              <a:t>07/08/2018</a:t>
+              <a:t>08/08/2018</a:t>
             </a:fld>
             <a:endParaRPr lang="en-US"/>
           </a:p>
@@ -1346,7 +1346,7 @@
           <a:p>
             <a:fld id="{756D4E82-7815-AC48-AE87-A78DE185AB60}" type="datetimeFigureOut">
               <a:rPr lang="fr-FR" smtClean="0"/>
-              <a:t>07/08/2018</a:t>
+              <a:t>08/08/2018</a:t>
             </a:fld>
             <a:endParaRPr lang="en-US"/>
           </a:p>
@@ -1765,7 +1765,7 @@
           <a:p>
             <a:fld id="{756D4E82-7815-AC48-AE87-A78DE185AB60}" type="datetimeFigureOut">
               <a:rPr lang="fr-FR" smtClean="0"/>
-              <a:t>07/08/2018</a:t>
+              <a:t>08/08/2018</a:t>
             </a:fld>
             <a:endParaRPr lang="en-US"/>
           </a:p>
@@ -1882,7 +1882,7 @@
           <a:p>
             <a:fld id="{756D4E82-7815-AC48-AE87-A78DE185AB60}" type="datetimeFigureOut">
               <a:rPr lang="fr-FR" smtClean="0"/>
-              <a:t>07/08/2018</a:t>
+              <a:t>08/08/2018</a:t>
             </a:fld>
             <a:endParaRPr lang="en-US"/>
           </a:p>
@@ -1977,7 +1977,7 @@
           <a:p>
             <a:fld id="{756D4E82-7815-AC48-AE87-A78DE185AB60}" type="datetimeFigureOut">
               <a:rPr lang="fr-FR" smtClean="0"/>
-              <a:t>07/08/2018</a:t>
+              <a:t>08/08/2018</a:t>
             </a:fld>
             <a:endParaRPr lang="en-US"/>
           </a:p>
@@ -2252,7 +2252,7 @@
           <a:p>
             <a:fld id="{756D4E82-7815-AC48-AE87-A78DE185AB60}" type="datetimeFigureOut">
               <a:rPr lang="fr-FR" smtClean="0"/>
-              <a:t>07/08/2018</a:t>
+              <a:t>08/08/2018</a:t>
             </a:fld>
             <a:endParaRPr lang="en-US"/>
           </a:p>
@@ -2504,7 +2504,7 @@
           <a:p>
             <a:fld id="{756D4E82-7815-AC48-AE87-A78DE185AB60}" type="datetimeFigureOut">
               <a:rPr lang="fr-FR" smtClean="0"/>
-              <a:t>07/08/2018</a:t>
+              <a:t>08/08/2018</a:t>
             </a:fld>
             <a:endParaRPr lang="en-US"/>
           </a:p>
@@ -2715,7 +2715,7 @@
           <a:p>
             <a:fld id="{756D4E82-7815-AC48-AE87-A78DE185AB60}" type="datetimeFigureOut">
               <a:rPr lang="fr-FR" smtClean="0"/>
-              <a:t>07/08/2018</a:t>
+              <a:t>08/08/2018</a:t>
             </a:fld>
             <a:endParaRPr lang="en-US"/>
           </a:p>
@@ -3092,14 +3092,76 @@
       </p:grpSpPr>
       <p:sp>
         <p:nvSpPr>
-          <p:cNvPr id="4" name="Rectangle 3"/>
+          <p:cNvPr id="6" name="Arc 5">
+            <a:extLst>
+              <a:ext uri="{FF2B5EF4-FFF2-40B4-BE49-F238E27FC236}">
+                <a16:creationId xmlns:a16="http://schemas.microsoft.com/office/drawing/2014/main" id="{5C0F5E40-9155-9945-92B5-6337DC86E540}"/>
+              </a:ext>
+            </a:extLst>
+          </p:cNvPr>
           <p:cNvSpPr/>
           <p:nvPr/>
         </p:nvSpPr>
         <p:spPr>
+          <a:xfrm rot="5400000" flipV="1">
+            <a:off x="2159732" y="4557841"/>
+            <a:ext cx="1296144" cy="1224136"/>
+          </a:xfrm>
+          <a:prstGeom prst="arc">
+            <a:avLst>
+              <a:gd name="adj1" fmla="val 10794271"/>
+              <a:gd name="adj2" fmla="val 21100438"/>
+            </a:avLst>
+          </a:prstGeom>
+          <a:noFill/>
+          <a:ln w="19050" cmpd="sng">
+            <a:solidFill>
+              <a:schemeClr val="tx1"/>
+            </a:solidFill>
+            <a:headEnd type="none" w="med" len="med"/>
+            <a:tailEnd type="triangle" w="lg" len="lg"/>
+          </a:ln>
+          <a:effectLst/>
+        </p:spPr>
+        <p:style>
+          <a:lnRef idx="1">
+            <a:schemeClr val="accent1"/>
+          </a:lnRef>
+          <a:fillRef idx="3">
+            <a:schemeClr val="accent1"/>
+          </a:fillRef>
+          <a:effectRef idx="2">
+            <a:schemeClr val="accent1"/>
+          </a:effectRef>
+          <a:fontRef idx="minor">
+            <a:schemeClr val="lt1"/>
+          </a:fontRef>
+        </p:style>
+        <p:txBody>
+          <a:bodyPr rtlCol="0" anchor="ctr"/>
+          <a:lstStyle/>
+          <a:p>
+            <a:pPr algn="ctr"/>
+            <a:endParaRPr lang="en-US" sz="1500"/>
+          </a:p>
+        </p:txBody>
+      </p:sp>
+      <p:sp>
+        <p:nvSpPr>
+          <p:cNvPr id="90" name="Rectangle 89">
+            <a:extLst>
+              <a:ext uri="{FF2B5EF4-FFF2-40B4-BE49-F238E27FC236}">
+                <a16:creationId xmlns:a16="http://schemas.microsoft.com/office/drawing/2014/main" id="{1DB8C921-C910-CA4D-8CE3-1A5FFFE3A780}"/>
+              </a:ext>
+            </a:extLst>
+          </p:cNvPr>
+          <p:cNvSpPr/>
+          <p:nvPr/>
+        </p:nvSpPr>
+        <p:spPr>
           <a:xfrm>
-            <a:off x="2809637" y="4869160"/>
-            <a:ext cx="3888432" cy="864096"/>
+            <a:off x="2699587" y="2501339"/>
+            <a:ext cx="3998482" cy="2582996"/>
           </a:xfrm>
           <a:prstGeom prst="rect">
             <a:avLst/>
@@ -3133,6 +3195,95 @@
           <a:lstStyle/>
           <a:p>
             <a:pPr algn="ctr"/>
+            <a:endParaRPr lang="en-US" sz="1500" dirty="0">
+              <a:solidFill>
+                <a:schemeClr val="tx1"/>
+              </a:solidFill>
+            </a:endParaRPr>
+          </a:p>
+        </p:txBody>
+      </p:sp>
+      <p:sp>
+        <p:nvSpPr>
+          <p:cNvPr id="95" name="TextBox 94">
+            <a:extLst>
+              <a:ext uri="{FF2B5EF4-FFF2-40B4-BE49-F238E27FC236}">
+                <a16:creationId xmlns:a16="http://schemas.microsoft.com/office/drawing/2014/main" id="{CBC51769-2C7A-6644-AAF9-2B702CF1E61C}"/>
+              </a:ext>
+            </a:extLst>
+          </p:cNvPr>
+          <p:cNvSpPr txBox="1"/>
+          <p:nvPr/>
+        </p:nvSpPr>
+        <p:spPr>
+          <a:xfrm>
+            <a:off x="1782938" y="5054493"/>
+            <a:ext cx="863891" cy="246221"/>
+          </a:xfrm>
+          <a:prstGeom prst="rect">
+            <a:avLst/>
+          </a:prstGeom>
+          <a:solidFill>
+            <a:schemeClr val="bg1"/>
+          </a:solidFill>
+        </p:spPr>
+        <p:txBody>
+          <a:bodyPr wrap="none" lIns="0" tIns="0" rIns="0" bIns="0" rtlCol="0">
+            <a:spAutoFit/>
+          </a:bodyPr>
+          <a:lstStyle/>
+          <a:p>
+            <a:pPr algn="ctr"/>
+            <a:r>
+              <a:rPr lang="en-US" sz="1600" i="1" dirty="0"/>
+              <a:t>configures</a:t>
+            </a:r>
+          </a:p>
+        </p:txBody>
+      </p:sp>
+      <p:sp>
+        <p:nvSpPr>
+          <p:cNvPr id="4" name="Rectangle 3"/>
+          <p:cNvSpPr/>
+          <p:nvPr/>
+        </p:nvSpPr>
+        <p:spPr>
+          <a:xfrm>
+            <a:off x="2699587" y="5228351"/>
+            <a:ext cx="3998482" cy="864096"/>
+          </a:xfrm>
+          <a:prstGeom prst="rect">
+            <a:avLst/>
+          </a:prstGeom>
+          <a:solidFill>
+            <a:schemeClr val="bg1"/>
+          </a:solidFill>
+          <a:ln w="28575" cmpd="sng">
+            <a:solidFill>
+              <a:srgbClr val="C00000"/>
+            </a:solidFill>
+          </a:ln>
+          <a:effectLst/>
+        </p:spPr>
+        <p:style>
+          <a:lnRef idx="1">
+            <a:schemeClr val="accent1"/>
+          </a:lnRef>
+          <a:fillRef idx="3">
+            <a:schemeClr val="accent1"/>
+          </a:fillRef>
+          <a:effectRef idx="2">
+            <a:schemeClr val="accent1"/>
+          </a:effectRef>
+          <a:fontRef idx="minor">
+            <a:schemeClr val="lt1"/>
+          </a:fontRef>
+        </p:style>
+        <p:txBody>
+          <a:bodyPr rtlCol="0" anchor="ctr"/>
+          <a:lstStyle/>
+          <a:p>
+            <a:pPr algn="ctr"/>
             <a:r>
               <a:rPr lang="en-US" sz="2400" b="1" dirty="0" err="1">
                 <a:solidFill>
@@ -3154,7 +3305,7 @@
                   <a:srgbClr val="C00000"/>
                 </a:solidFill>
               </a:rPr>
-              <a:t>(set-based onion routing)</a:t>
+              <a:t>(set-based onion routing header format)</a:t>
             </a:r>
           </a:p>
         </p:txBody>
@@ -3167,7 +3318,7 @@
         </p:nvSpPr>
         <p:spPr>
           <a:xfrm>
-            <a:off x="2953653" y="4009758"/>
+            <a:off x="2915816" y="4368949"/>
             <a:ext cx="3600400" cy="504056"/>
           </a:xfrm>
           <a:prstGeom prst="rect">
@@ -3221,7 +3372,7 @@
         </p:nvSpPr>
         <p:spPr>
           <a:xfrm>
-            <a:off x="3025661" y="3334554"/>
+            <a:off x="2987824" y="3693745"/>
             <a:ext cx="2383456" cy="504056"/>
           </a:xfrm>
           <a:prstGeom prst="rect">
@@ -3366,7 +3517,7 @@
         </p:nvSpPr>
         <p:spPr>
           <a:xfrm>
-            <a:off x="3025661" y="2636912"/>
+            <a:off x="2987824" y="2996103"/>
             <a:ext cx="2383456" cy="504056"/>
           </a:xfrm>
           <a:prstGeom prst="rect">
@@ -3414,61 +3565,6 @@
       </p:sp>
       <p:sp>
         <p:nvSpPr>
-          <p:cNvPr id="90" name="Rectangle 89">
-            <a:extLst>
-              <a:ext uri="{FF2B5EF4-FFF2-40B4-BE49-F238E27FC236}">
-                <a16:creationId xmlns:a16="http://schemas.microsoft.com/office/drawing/2014/main" id="{1DB8C921-C910-CA4D-8CE3-1A5FFFE3A780}"/>
-              </a:ext>
-            </a:extLst>
-          </p:cNvPr>
-          <p:cNvSpPr/>
-          <p:nvPr/>
-        </p:nvSpPr>
-        <p:spPr>
-          <a:xfrm>
-            <a:off x="2809637" y="2142148"/>
-            <a:ext cx="3888432" cy="2582996"/>
-          </a:xfrm>
-          <a:prstGeom prst="rect">
-            <a:avLst/>
-          </a:prstGeom>
-          <a:noFill/>
-          <a:ln w="28575" cmpd="sng">
-            <a:solidFill>
-              <a:srgbClr val="C00000"/>
-            </a:solidFill>
-          </a:ln>
-          <a:effectLst/>
-        </p:spPr>
-        <p:style>
-          <a:lnRef idx="1">
-            <a:schemeClr val="accent1"/>
-          </a:lnRef>
-          <a:fillRef idx="3">
-            <a:schemeClr val="accent1"/>
-          </a:fillRef>
-          <a:effectRef idx="2">
-            <a:schemeClr val="accent1"/>
-          </a:effectRef>
-          <a:fontRef idx="minor">
-            <a:schemeClr val="lt1"/>
-          </a:fontRef>
-        </p:style>
-        <p:txBody>
-          <a:bodyPr rtlCol="0" anchor="ctr"/>
-          <a:lstStyle/>
-          <a:p>
-            <a:pPr algn="ctr"/>
-            <a:endParaRPr lang="en-US" sz="1500" dirty="0">
-              <a:solidFill>
-                <a:schemeClr val="tx1"/>
-              </a:solidFill>
-            </a:endParaRPr>
-          </a:p>
-        </p:txBody>
-      </p:sp>
-      <p:sp>
-        <p:nvSpPr>
           <p:cNvPr id="5" name="TextBox 4">
             <a:extLst>
               <a:ext uri="{FF2B5EF4-FFF2-40B4-BE49-F238E27FC236}">
@@ -3481,8 +3577,8 @@
         </p:nvSpPr>
         <p:spPr>
           <a:xfrm>
-            <a:off x="4000160" y="1671191"/>
-            <a:ext cx="979755" cy="461665"/>
+            <a:off x="2968175" y="1671191"/>
+            <a:ext cx="4647812" cy="738664"/>
           </a:xfrm>
           <a:prstGeom prst="rect">
             <a:avLst/>
@@ -3495,6 +3591,7 @@
           </a:bodyPr>
           <a:lstStyle/>
           <a:p>
+            <a:pPr algn="ctr"/>
             <a:r>
               <a:rPr lang="en-US" sz="2400" b="1" dirty="0">
                 <a:solidFill>
@@ -3519,62 +3616,26 @@
               </a:rPr>
               <a:t>OR</a:t>
             </a:r>
-          </a:p>
-        </p:txBody>
-      </p:sp>
-      <p:sp>
-        <p:nvSpPr>
-          <p:cNvPr id="6" name="Arc 5">
-            <a:extLst>
-              <a:ext uri="{FF2B5EF4-FFF2-40B4-BE49-F238E27FC236}">
-                <a16:creationId xmlns:a16="http://schemas.microsoft.com/office/drawing/2014/main" id="{5C0F5E40-9155-9945-92B5-6337DC86E540}"/>
-              </a:ext>
-            </a:extLst>
-          </p:cNvPr>
-          <p:cNvSpPr/>
-          <p:nvPr/>
-        </p:nvSpPr>
-        <p:spPr>
-          <a:xfrm rot="5400000" flipV="1">
-            <a:off x="2159732" y="4198650"/>
-            <a:ext cx="1296144" cy="1224136"/>
-          </a:xfrm>
-          <a:prstGeom prst="arc">
-            <a:avLst>
-              <a:gd name="adj1" fmla="val 10794271"/>
-              <a:gd name="adj2" fmla="val 0"/>
-            </a:avLst>
-          </a:prstGeom>
-          <a:noFill/>
-          <a:ln w="19050" cmpd="sng">
-            <a:solidFill>
-              <a:schemeClr val="tx1"/>
-            </a:solidFill>
-            <a:headEnd type="none" w="med" len="med"/>
-            <a:tailEnd type="triangle" w="lg" len="lg"/>
-          </a:ln>
-          <a:effectLst/>
-        </p:spPr>
-        <p:style>
-          <a:lnRef idx="1">
-            <a:schemeClr val="accent1"/>
-          </a:lnRef>
-          <a:fillRef idx="3">
-            <a:schemeClr val="accent1"/>
-          </a:fillRef>
-          <a:effectRef idx="2">
-            <a:schemeClr val="accent1"/>
-          </a:effectRef>
-          <a:fontRef idx="minor">
-            <a:schemeClr val="lt1"/>
-          </a:fontRef>
-        </p:style>
-        <p:txBody>
-          <a:bodyPr rtlCol="0" anchor="ctr"/>
-          <a:lstStyle/>
-          <a:p>
-            <a:pPr algn="ctr"/>
-            <a:endParaRPr lang="en-US" sz="1500"/>
+            <a:br>
+              <a:rPr lang="en-US" sz="2400" b="1" dirty="0">
+                <a:solidFill>
+                  <a:srgbClr val="0070C0"/>
+                </a:solidFill>
+              </a:rPr>
+            </a:br>
+            <a:r>
+              <a:rPr lang="en-US" dirty="0">
+                <a:solidFill>
+                  <a:srgbClr val="0070C0"/>
+                </a:solidFill>
+              </a:rPr>
+              <a:t>(stateless predictive probabilistic onion routing)</a:t>
+            </a:r>
+            <a:endParaRPr lang="en-US" sz="2400" dirty="0">
+              <a:solidFill>
+                <a:srgbClr val="0070C0"/>
+              </a:solidFill>
+            </a:endParaRPr>
           </a:p>
         </p:txBody>
       </p:sp>
@@ -3591,13 +3652,13 @@
           <p:nvPr/>
         </p:nvSpPr>
         <p:spPr>
-          <a:xfrm rot="6493587" flipV="1">
-            <a:off x="2298359" y="134700"/>
+          <a:xfrm rot="5982178" flipV="1">
+            <a:off x="2269687" y="-87194"/>
             <a:ext cx="1947505" cy="3838304"/>
           </a:xfrm>
           <a:prstGeom prst="arc">
             <a:avLst>
-              <a:gd name="adj1" fmla="val 12538423"/>
+              <a:gd name="adj1" fmla="val 10932108"/>
               <a:gd name="adj2" fmla="val 17595619"/>
             </a:avLst>
           </a:prstGeom>
@@ -3649,7 +3710,7 @@
         <p:spPr>
           <a:xfrm>
             <a:off x="1691680" y="1628800"/>
-            <a:ext cx="7200800" cy="4392488"/>
+            <a:ext cx="7200800" cy="4680520"/>
           </a:xfrm>
           <a:prstGeom prst="rect">
             <a:avLst/>
@@ -3703,7 +3764,7 @@
         </p:nvSpPr>
         <p:spPr>
           <a:xfrm>
-            <a:off x="3507363" y="2175247"/>
+            <a:off x="3507363" y="2534438"/>
             <a:ext cx="2114681" cy="461665"/>
           </a:xfrm>
           <a:prstGeom prst="rect">
@@ -3767,44 +3828,6 @@
       </p:sp>
       <p:sp>
         <p:nvSpPr>
-          <p:cNvPr id="95" name="TextBox 94">
-            <a:extLst>
-              <a:ext uri="{FF2B5EF4-FFF2-40B4-BE49-F238E27FC236}">
-                <a16:creationId xmlns:a16="http://schemas.microsoft.com/office/drawing/2014/main" id="{CBC51769-2C7A-6644-AAF9-2B702CF1E61C}"/>
-              </a:ext>
-            </a:extLst>
-          </p:cNvPr>
-          <p:cNvSpPr txBox="1"/>
-          <p:nvPr/>
-        </p:nvSpPr>
-        <p:spPr>
-          <a:xfrm>
-            <a:off x="1835696" y="4695302"/>
-            <a:ext cx="863891" cy="246221"/>
-          </a:xfrm>
-          <a:prstGeom prst="rect">
-            <a:avLst/>
-          </a:prstGeom>
-          <a:solidFill>
-            <a:schemeClr val="bg1"/>
-          </a:solidFill>
-        </p:spPr>
-        <p:txBody>
-          <a:bodyPr wrap="none" lIns="0" tIns="0" rIns="0" bIns="0" rtlCol="0">
-            <a:spAutoFit/>
-          </a:bodyPr>
-          <a:lstStyle/>
-          <a:p>
-            <a:pPr algn="ctr"/>
-            <a:r>
-              <a:rPr lang="en-US" sz="1600" i="1" dirty="0"/>
-              <a:t>configures</a:t>
-            </a:r>
-          </a:p>
-        </p:txBody>
-      </p:sp>
-      <p:sp>
-        <p:nvSpPr>
           <p:cNvPr id="91" name="Rectangle 90">
             <a:extLst>
               <a:ext uri="{FF2B5EF4-FFF2-40B4-BE49-F238E27FC236}">
@@ -3817,7 +3840,7 @@
         </p:nvSpPr>
         <p:spPr>
           <a:xfrm>
-            <a:off x="2809638" y="602662"/>
+            <a:off x="3347864" y="602662"/>
             <a:ext cx="3888432" cy="864096"/>
           </a:xfrm>
           <a:prstGeom prst="rect">
@@ -3877,7 +3900,7 @@
         </p:nvSpPr>
         <p:spPr>
           <a:xfrm>
-            <a:off x="5581945" y="3334554"/>
+            <a:off x="5544108" y="3693745"/>
             <a:ext cx="907292" cy="504056"/>
           </a:xfrm>
           <a:prstGeom prst="rect">
@@ -3954,7 +3977,7 @@
         </p:nvCxnSpPr>
         <p:spPr>
           <a:xfrm>
-            <a:off x="4217389" y="3140968"/>
+            <a:off x="4179552" y="3500159"/>
             <a:ext cx="0" cy="193586"/>
           </a:xfrm>
           <a:prstGeom prst="straightConnector1">
@@ -4002,7 +4025,7 @@
         </p:nvCxnSpPr>
         <p:spPr>
           <a:xfrm>
-            <a:off x="4217389" y="3838610"/>
+            <a:off x="4179552" y="4197801"/>
             <a:ext cx="0" cy="171148"/>
           </a:xfrm>
           <a:prstGeom prst="straightConnector1">
@@ -4049,7 +4072,7 @@
         </p:nvCxnSpPr>
         <p:spPr>
           <a:xfrm>
-            <a:off x="6049997" y="3838610"/>
+            <a:off x="6012160" y="4197801"/>
             <a:ext cx="0" cy="171148"/>
           </a:xfrm>
           <a:prstGeom prst="straightConnector1">
@@ -4094,7 +4117,7 @@
         </p:nvSpPr>
         <p:spPr>
           <a:xfrm>
-            <a:off x="6858210" y="5154423"/>
+            <a:off x="6858210" y="5513614"/>
             <a:ext cx="1810888" cy="413666"/>
           </a:xfrm>
           <a:custGeom>
@@ -4369,7 +4392,7 @@
         </p:nvGrpSpPr>
         <p:grpSpPr>
           <a:xfrm>
-            <a:off x="7005790" y="4926983"/>
+            <a:off x="7005790" y="5286174"/>
             <a:ext cx="360040" cy="807122"/>
             <a:chOff x="7311868" y="4926983"/>
             <a:chExt cx="360040" cy="807122"/>
@@ -4629,7 +4652,7 @@
         </p:nvGrpSpPr>
         <p:grpSpPr>
           <a:xfrm>
-            <a:off x="7551275" y="4926983"/>
+            <a:off x="7551275" y="5286174"/>
             <a:ext cx="360040" cy="807122"/>
             <a:chOff x="7857353" y="4926983"/>
             <a:chExt cx="360040" cy="807122"/>
@@ -4889,7 +4912,7 @@
         </p:nvGrpSpPr>
         <p:grpSpPr>
           <a:xfrm>
-            <a:off x="8096760" y="4926134"/>
+            <a:off x="8096760" y="5285325"/>
             <a:ext cx="360040" cy="807122"/>
             <a:chOff x="8402838" y="4926134"/>
             <a:chExt cx="360040" cy="807122"/>
@@ -5149,7 +5172,7 @@
         </p:nvSpPr>
         <p:spPr>
           <a:xfrm>
-            <a:off x="7005790" y="3925714"/>
+            <a:off x="7005790" y="4284905"/>
             <a:ext cx="360040" cy="807122"/>
           </a:xfrm>
           <a:prstGeom prst="ellipse">
@@ -5215,7 +5238,7 @@
         </p:nvSpPr>
         <p:spPr>
           <a:xfrm>
-            <a:off x="7113802" y="4011907"/>
+            <a:off x="7113802" y="4371098"/>
             <a:ext cx="144016" cy="141247"/>
           </a:xfrm>
           <a:prstGeom prst="ellipse">
@@ -5278,7 +5301,7 @@
         </p:nvSpPr>
         <p:spPr>
           <a:xfrm>
-            <a:off x="7111941" y="4507715"/>
+            <a:off x="7111941" y="4866906"/>
             <a:ext cx="144016" cy="141247"/>
           </a:xfrm>
           <a:prstGeom prst="ellipse">
@@ -5341,7 +5364,7 @@
         </p:nvSpPr>
         <p:spPr>
           <a:xfrm rot="5400000">
-            <a:off x="7128106" y="4242484"/>
+            <a:off x="7128106" y="4601675"/>
             <a:ext cx="192360" cy="184666"/>
           </a:xfrm>
           <a:prstGeom prst="rect">
@@ -5380,7 +5403,7 @@
         </p:nvSpPr>
         <p:spPr>
           <a:xfrm>
-            <a:off x="7551275" y="3925714"/>
+            <a:off x="7551275" y="4284905"/>
             <a:ext cx="360040" cy="807122"/>
           </a:xfrm>
           <a:prstGeom prst="ellipse">
@@ -5446,7 +5469,7 @@
         </p:nvSpPr>
         <p:spPr>
           <a:xfrm>
-            <a:off x="7659287" y="4011907"/>
+            <a:off x="7659287" y="4371098"/>
             <a:ext cx="144016" cy="141247"/>
           </a:xfrm>
           <a:prstGeom prst="ellipse">
@@ -5509,7 +5532,7 @@
         </p:nvSpPr>
         <p:spPr>
           <a:xfrm>
-            <a:off x="7657426" y="4507715"/>
+            <a:off x="7657426" y="4866906"/>
             <a:ext cx="144016" cy="141247"/>
           </a:xfrm>
           <a:prstGeom prst="ellipse">
@@ -5572,7 +5595,7 @@
         </p:nvSpPr>
         <p:spPr>
           <a:xfrm rot="5400000">
-            <a:off x="7673591" y="4242484"/>
+            <a:off x="7673591" y="4601675"/>
             <a:ext cx="192360" cy="184666"/>
           </a:xfrm>
           <a:prstGeom prst="rect">
@@ -5611,7 +5634,7 @@
         </p:nvSpPr>
         <p:spPr>
           <a:xfrm>
-            <a:off x="8096760" y="3924865"/>
+            <a:off x="8096760" y="4284056"/>
             <a:ext cx="360040" cy="807122"/>
           </a:xfrm>
           <a:prstGeom prst="ellipse">
@@ -5677,7 +5700,7 @@
         </p:nvSpPr>
         <p:spPr>
           <a:xfrm>
-            <a:off x="8204772" y="4011058"/>
+            <a:off x="8204772" y="4370249"/>
             <a:ext cx="144016" cy="141247"/>
           </a:xfrm>
           <a:prstGeom prst="ellipse">
@@ -5740,7 +5763,7 @@
         </p:nvSpPr>
         <p:spPr>
           <a:xfrm>
-            <a:off x="8202911" y="4506866"/>
+            <a:off x="8202911" y="4866057"/>
             <a:ext cx="144016" cy="141247"/>
           </a:xfrm>
           <a:prstGeom prst="ellipse">
@@ -5803,7 +5826,7 @@
         </p:nvSpPr>
         <p:spPr>
           <a:xfrm rot="5400000">
-            <a:off x="8219076" y="4241635"/>
+            <a:off x="8219076" y="4600826"/>
             <a:ext cx="192360" cy="184666"/>
           </a:xfrm>
           <a:prstGeom prst="rect">
@@ -5842,7 +5865,7 @@
         </p:nvGrpSpPr>
         <p:grpSpPr>
           <a:xfrm>
-            <a:off x="7506282" y="2492896"/>
+            <a:off x="7506282" y="2852087"/>
             <a:ext cx="594110" cy="542557"/>
             <a:chOff x="7164285" y="2492896"/>
             <a:chExt cx="594110" cy="542557"/>
@@ -6199,7 +6222,7 @@
         </p:nvSpPr>
         <p:spPr>
           <a:xfrm>
-            <a:off x="6853610" y="3176700"/>
+            <a:off x="6853610" y="3535891"/>
             <a:ext cx="594110" cy="542557"/>
           </a:xfrm>
           <a:prstGeom prst="cloud">
@@ -6265,7 +6288,7 @@
         </p:nvSpPr>
         <p:spPr>
           <a:xfrm>
-            <a:off x="6894164" y="3245131"/>
+            <a:off x="6894164" y="3604322"/>
             <a:ext cx="499297" cy="405037"/>
           </a:xfrm>
           <a:prstGeom prst="ellipse">
@@ -6328,7 +6351,7 @@
         </p:nvSpPr>
         <p:spPr>
           <a:xfrm>
-            <a:off x="6950148" y="3377025"/>
+            <a:off x="6950148" y="3736216"/>
             <a:ext cx="144016" cy="141247"/>
           </a:xfrm>
           <a:prstGeom prst="ellipse">
@@ -6391,7 +6414,7 @@
         </p:nvSpPr>
         <p:spPr>
           <a:xfrm>
-            <a:off x="7141645" y="3267524"/>
+            <a:off x="7141645" y="3626715"/>
             <a:ext cx="144016" cy="141247"/>
           </a:xfrm>
           <a:prstGeom prst="ellipse">
@@ -6454,7 +6477,7 @@
         </p:nvSpPr>
         <p:spPr>
           <a:xfrm>
-            <a:off x="7141160" y="3458846"/>
+            <a:off x="7141160" y="3818037"/>
             <a:ext cx="144016" cy="141247"/>
           </a:xfrm>
           <a:prstGeom prst="ellipse">
@@ -6517,7 +6540,7 @@
         </p:nvSpPr>
         <p:spPr>
           <a:xfrm>
-            <a:off x="7506282" y="3170394"/>
+            <a:off x="7506282" y="3529585"/>
             <a:ext cx="594110" cy="542557"/>
           </a:xfrm>
           <a:prstGeom prst="cloud">
@@ -6583,7 +6606,7 @@
         </p:nvSpPr>
         <p:spPr>
           <a:xfrm>
-            <a:off x="7546836" y="3238825"/>
+            <a:off x="7546836" y="3598016"/>
             <a:ext cx="499297" cy="405037"/>
           </a:xfrm>
           <a:prstGeom prst="ellipse">
@@ -6646,7 +6669,7 @@
         </p:nvSpPr>
         <p:spPr>
           <a:xfrm>
-            <a:off x="7794317" y="3261218"/>
+            <a:off x="7794317" y="3620409"/>
             <a:ext cx="144016" cy="141247"/>
           </a:xfrm>
           <a:prstGeom prst="ellipse">
@@ -6709,7 +6732,7 @@
         </p:nvSpPr>
         <p:spPr>
           <a:xfrm>
-            <a:off x="7793832" y="3452540"/>
+            <a:off x="7793832" y="3811731"/>
             <a:ext cx="144016" cy="141247"/>
           </a:xfrm>
           <a:prstGeom prst="ellipse">
@@ -6772,7 +6795,7 @@
         </p:nvSpPr>
         <p:spPr>
           <a:xfrm>
-            <a:off x="8154354" y="3164088"/>
+            <a:off x="8154354" y="3523279"/>
             <a:ext cx="594110" cy="542557"/>
           </a:xfrm>
           <a:prstGeom prst="cloud">
@@ -6838,7 +6861,7 @@
         </p:nvSpPr>
         <p:spPr>
           <a:xfrm>
-            <a:off x="8194908" y="3232519"/>
+            <a:off x="8194908" y="3591710"/>
             <a:ext cx="499297" cy="405037"/>
           </a:xfrm>
           <a:prstGeom prst="ellipse">
@@ -6901,7 +6924,7 @@
         </p:nvSpPr>
         <p:spPr>
           <a:xfrm>
-            <a:off x="8250892" y="3364413"/>
+            <a:off x="8250892" y="3723604"/>
             <a:ext cx="144016" cy="141247"/>
           </a:xfrm>
           <a:prstGeom prst="ellipse">
@@ -6964,7 +6987,7 @@
         </p:nvSpPr>
         <p:spPr>
           <a:xfrm>
-            <a:off x="8442389" y="3254912"/>
+            <a:off x="8442389" y="3614103"/>
             <a:ext cx="144016" cy="141247"/>
           </a:xfrm>
           <a:prstGeom prst="ellipse">
@@ -7027,7 +7050,7 @@
         </p:nvSpPr>
         <p:spPr>
           <a:xfrm>
-            <a:off x="8441904" y="3446234"/>
+            <a:off x="8441904" y="3805425"/>
             <a:ext cx="144016" cy="141247"/>
           </a:xfrm>
           <a:prstGeom prst="ellipse">
@@ -7094,7 +7117,7 @@
         </p:nvCxnSpPr>
         <p:spPr>
           <a:xfrm>
-            <a:off x="7285661" y="3338148"/>
+            <a:off x="7285661" y="3697339"/>
             <a:ext cx="338250" cy="53256"/>
           </a:xfrm>
           <a:prstGeom prst="line">
@@ -7144,7 +7167,7 @@
         </p:nvCxnSpPr>
         <p:spPr>
           <a:xfrm flipV="1">
-            <a:off x="7285176" y="3381780"/>
+            <a:off x="7285176" y="3740971"/>
             <a:ext cx="530232" cy="147690"/>
           </a:xfrm>
           <a:prstGeom prst="line">
@@ -7194,7 +7217,7 @@
         </p:nvCxnSpPr>
         <p:spPr>
           <a:xfrm flipV="1">
-            <a:off x="7937848" y="3435037"/>
+            <a:off x="7937848" y="3794228"/>
             <a:ext cx="313044" cy="88127"/>
           </a:xfrm>
           <a:prstGeom prst="line">
@@ -7244,7 +7267,7 @@
         </p:nvCxnSpPr>
         <p:spPr>
           <a:xfrm>
-            <a:off x="7938333" y="3331842"/>
+            <a:off x="7938333" y="3691033"/>
             <a:ext cx="333650" cy="53256"/>
           </a:xfrm>
           <a:prstGeom prst="line">
@@ -7290,7 +7313,7 @@
         </p:nvSpPr>
         <p:spPr>
           <a:xfrm>
-            <a:off x="7602820" y="3370719"/>
+            <a:off x="7602820" y="3729910"/>
             <a:ext cx="144016" cy="141247"/>
           </a:xfrm>
           <a:prstGeom prst="ellipse">
@@ -7357,7 +7380,7 @@
         </p:nvCxnSpPr>
         <p:spPr>
           <a:xfrm flipH="1">
-            <a:off x="7073073" y="3338148"/>
+            <a:off x="7073073" y="3697339"/>
             <a:ext cx="68572" cy="59562"/>
           </a:xfrm>
           <a:prstGeom prst="line">
@@ -7407,7 +7430,7 @@
         </p:nvCxnSpPr>
         <p:spPr>
           <a:xfrm flipH="1">
-            <a:off x="8513912" y="3396159"/>
+            <a:off x="8513912" y="3755350"/>
             <a:ext cx="485" cy="50075"/>
           </a:xfrm>
           <a:prstGeom prst="line">
@@ -7457,7 +7480,7 @@
         </p:nvCxnSpPr>
         <p:spPr>
           <a:xfrm flipV="1">
-            <a:off x="7917242" y="3275597"/>
+            <a:off x="7917242" y="3634788"/>
             <a:ext cx="546238" cy="6306"/>
           </a:xfrm>
           <a:prstGeom prst="line">
@@ -7507,7 +7530,7 @@
         </p:nvCxnSpPr>
         <p:spPr>
           <a:xfrm flipH="1">
-            <a:off x="7725745" y="2654344"/>
+            <a:off x="7725745" y="3013535"/>
             <a:ext cx="68572" cy="59562"/>
           </a:xfrm>
           <a:prstGeom prst="line">
@@ -7557,7 +7580,7 @@
         </p:nvCxnSpPr>
         <p:spPr>
           <a:xfrm flipH="1" flipV="1">
-            <a:off x="7725745" y="2813783"/>
+            <a:off x="7725745" y="3172974"/>
             <a:ext cx="68087" cy="31883"/>
           </a:xfrm>
           <a:prstGeom prst="line">
@@ -7607,7 +7630,7 @@
         </p:nvCxnSpPr>
         <p:spPr>
           <a:xfrm flipV="1">
-            <a:off x="7865840" y="2724967"/>
+            <a:off x="7865840" y="3084158"/>
             <a:ext cx="485" cy="50075"/>
           </a:xfrm>
           <a:prstGeom prst="line">
@@ -7653,7 +7676,7 @@
         </p:nvSpPr>
         <p:spPr bwMode="auto">
           <a:xfrm>
-            <a:off x="6156176" y="5085184"/>
+            <a:off x="6156176" y="5300359"/>
             <a:ext cx="381000" cy="381000"/>
           </a:xfrm>
           <a:prstGeom prst="ellipse">
@@ -7716,7 +7739,7 @@
         </p:nvSpPr>
         <p:spPr bwMode="auto">
           <a:xfrm>
-            <a:off x="6156176" y="2273343"/>
+            <a:off x="6156176" y="2632534"/>
             <a:ext cx="381000" cy="381000"/>
           </a:xfrm>
           <a:prstGeom prst="ellipse">
@@ -7800,7 +7823,7 @@
         </p:nvSpPr>
         <p:spPr bwMode="auto">
           <a:xfrm>
-            <a:off x="6156176" y="839684"/>
+            <a:off x="6711280" y="839684"/>
             <a:ext cx="381000" cy="381000"/>
           </a:xfrm>
           <a:prstGeom prst="ellipse">

</xml_diff>

<commit_message>
Tweaking layout of Figure 1
</commit_message>
<xml_diff>
--- a/paper/figures/OverviewSPORES.pptx
+++ b/paper/figures/OverviewSPORES.pptx
@@ -3425,8 +3425,8 @@
         </p:nvSpPr>
         <p:spPr>
           <a:xfrm flipH="1">
-            <a:off x="854530" y="602662"/>
-            <a:ext cx="498821" cy="5418626"/>
+            <a:off x="854529" y="602662"/>
+            <a:ext cx="498821" cy="5706658"/>
           </a:xfrm>
           <a:prstGeom prst="rightBrace">
             <a:avLst>
@@ -3473,7 +3473,7 @@
         </p:nvSpPr>
         <p:spPr>
           <a:xfrm rot="16200000">
-            <a:off x="-94292" y="3025115"/>
+            <a:off x="-94292" y="3155196"/>
             <a:ext cx="1526103" cy="461665"/>
           </a:xfrm>
           <a:prstGeom prst="rect">

</xml_diff>